<commit_message>
put slides together for andre
</commit_message>
<xml_diff>
--- a/writing/results slides.pptx
+++ b/writing/results slides.pptx
@@ -105,6 +105,11 @@
       </a:defRPr>
     </a:lvl9pPr>
   </p:defaultTextStyle>
+  <p:extLst>
+    <p:ext uri="{EFAFB233-063F-42B5-8137-9DF3F51BA10A}">
+      <p15:sldGuideLst xmlns:p15="http://schemas.microsoft.com/office/powerpoint/2012/main"/>
+    </p:ext>
+  </p:extLst>
 </p:presentation>
 </file>
 
@@ -255,7 +260,7 @@
           <a:p>
             <a:fld id="{A591A2D9-B551-4172-8EC7-3A958AEF6862}" type="datetimeFigureOut">
               <a:rPr lang="en-US" smtClean="0"/>
-              <a:t>1/31/2019</a:t>
+              <a:t>2/1/2019</a:t>
             </a:fld>
             <a:endParaRPr lang="en-US"/>
           </a:p>
@@ -453,7 +458,7 @@
           <a:p>
             <a:fld id="{A591A2D9-B551-4172-8EC7-3A958AEF6862}" type="datetimeFigureOut">
               <a:rPr lang="en-US" smtClean="0"/>
-              <a:t>1/31/2019</a:t>
+              <a:t>2/1/2019</a:t>
             </a:fld>
             <a:endParaRPr lang="en-US"/>
           </a:p>
@@ -661,7 +666,7 @@
           <a:p>
             <a:fld id="{A591A2D9-B551-4172-8EC7-3A958AEF6862}" type="datetimeFigureOut">
               <a:rPr lang="en-US" smtClean="0"/>
-              <a:t>1/31/2019</a:t>
+              <a:t>2/1/2019</a:t>
             </a:fld>
             <a:endParaRPr lang="en-US"/>
           </a:p>
@@ -859,7 +864,7 @@
           <a:p>
             <a:fld id="{A591A2D9-B551-4172-8EC7-3A958AEF6862}" type="datetimeFigureOut">
               <a:rPr lang="en-US" smtClean="0"/>
-              <a:t>1/31/2019</a:t>
+              <a:t>2/1/2019</a:t>
             </a:fld>
             <a:endParaRPr lang="en-US"/>
           </a:p>
@@ -1134,7 +1139,7 @@
           <a:p>
             <a:fld id="{A591A2D9-B551-4172-8EC7-3A958AEF6862}" type="datetimeFigureOut">
               <a:rPr lang="en-US" smtClean="0"/>
-              <a:t>1/31/2019</a:t>
+              <a:t>2/1/2019</a:t>
             </a:fld>
             <a:endParaRPr lang="en-US"/>
           </a:p>
@@ -1399,7 +1404,7 @@
           <a:p>
             <a:fld id="{A591A2D9-B551-4172-8EC7-3A958AEF6862}" type="datetimeFigureOut">
               <a:rPr lang="en-US" smtClean="0"/>
-              <a:t>1/31/2019</a:t>
+              <a:t>2/1/2019</a:t>
             </a:fld>
             <a:endParaRPr lang="en-US"/>
           </a:p>
@@ -1811,7 +1816,7 @@
           <a:p>
             <a:fld id="{A591A2D9-B551-4172-8EC7-3A958AEF6862}" type="datetimeFigureOut">
               <a:rPr lang="en-US" smtClean="0"/>
-              <a:t>1/31/2019</a:t>
+              <a:t>2/1/2019</a:t>
             </a:fld>
             <a:endParaRPr lang="en-US"/>
           </a:p>
@@ -1952,7 +1957,7 @@
           <a:p>
             <a:fld id="{A591A2D9-B551-4172-8EC7-3A958AEF6862}" type="datetimeFigureOut">
               <a:rPr lang="en-US" smtClean="0"/>
-              <a:t>1/31/2019</a:t>
+              <a:t>2/1/2019</a:t>
             </a:fld>
             <a:endParaRPr lang="en-US"/>
           </a:p>
@@ -2065,7 +2070,7 @@
           <a:p>
             <a:fld id="{A591A2D9-B551-4172-8EC7-3A958AEF6862}" type="datetimeFigureOut">
               <a:rPr lang="en-US" smtClean="0"/>
-              <a:t>1/31/2019</a:t>
+              <a:t>2/1/2019</a:t>
             </a:fld>
             <a:endParaRPr lang="en-US"/>
           </a:p>
@@ -2376,7 +2381,7 @@
           <a:p>
             <a:fld id="{A591A2D9-B551-4172-8EC7-3A958AEF6862}" type="datetimeFigureOut">
               <a:rPr lang="en-US" smtClean="0"/>
-              <a:t>1/31/2019</a:t>
+              <a:t>2/1/2019</a:t>
             </a:fld>
             <a:endParaRPr lang="en-US"/>
           </a:p>
@@ -2664,7 +2669,7 @@
           <a:p>
             <a:fld id="{A591A2D9-B551-4172-8EC7-3A958AEF6862}" type="datetimeFigureOut">
               <a:rPr lang="en-US" smtClean="0"/>
-              <a:t>1/31/2019</a:t>
+              <a:t>2/1/2019</a:t>
             </a:fld>
             <a:endParaRPr lang="en-US"/>
           </a:p>
@@ -2905,7 +2910,7 @@
           <a:p>
             <a:fld id="{A591A2D9-B551-4172-8EC7-3A958AEF6862}" type="datetimeFigureOut">
               <a:rPr lang="en-US" smtClean="0"/>
-              <a:t>1/31/2019</a:t>
+              <a:t>2/1/2019</a:t>
             </a:fld>
             <a:endParaRPr lang="en-US"/>
           </a:p>
@@ -3488,12 +3493,40 @@
           <a:chExt cx="0" cy="0"/>
         </a:xfrm>
       </p:grpSpPr>
+      <p:sp>
+        <p:nvSpPr>
+          <p:cNvPr id="12" name="Title 11">
+            <a:extLst>
+              <a:ext uri="{FF2B5EF4-FFF2-40B4-BE49-F238E27FC236}">
+                <a16:creationId xmlns:a16="http://schemas.microsoft.com/office/drawing/2014/main" id="{8C3D6B67-4A9A-49E9-BD5C-3DB96750E67E}"/>
+              </a:ext>
+            </a:extLst>
+          </p:cNvPr>
+          <p:cNvSpPr>
+            <a:spLocks noGrp="1"/>
+          </p:cNvSpPr>
+          <p:nvPr>
+            <p:ph type="title"/>
+          </p:nvPr>
+        </p:nvSpPr>
+        <p:spPr/>
+        <p:txBody>
+          <a:bodyPr/>
+          <a:lstStyle/>
+          <a:p>
+            <a:r>
+              <a:rPr lang="en-US" dirty="0"/>
+              <a:t>One spatial break @ 25 degrees – 31 Jan</a:t>
+            </a:r>
+          </a:p>
+        </p:txBody>
+      </p:sp>
       <p:pic>
         <p:nvPicPr>
-          <p:cNvPr id="5" name="Picture 4">
-            <a:extLst>
-              <a:ext uri="{FF2B5EF4-FFF2-40B4-BE49-F238E27FC236}">
-                <a16:creationId xmlns:a16="http://schemas.microsoft.com/office/drawing/2014/main" id="{55833C01-3FFD-4EC3-8D2B-626ADD074170}"/>
+          <p:cNvPr id="3" name="Picture 2">
+            <a:extLst>
+              <a:ext uri="{FF2B5EF4-FFF2-40B4-BE49-F238E27FC236}">
+                <a16:creationId xmlns:a16="http://schemas.microsoft.com/office/drawing/2014/main" id="{3AB842C3-6C94-4CF9-9FE1-35EA3C9B7463}"/>
               </a:ext>
             </a:extLst>
           </p:cNvPr>
@@ -3516,8 +3549,8 @@
         </p:blipFill>
         <p:spPr>
           <a:xfrm>
-            <a:off x="190028" y="1870363"/>
-            <a:ext cx="4156364" cy="3117273"/>
+            <a:off x="208760" y="2193351"/>
+            <a:ext cx="4267200" cy="3200400"/>
           </a:xfrm>
           <a:prstGeom prst="rect">
             <a:avLst/>
@@ -3526,10 +3559,10 @@
       </p:pic>
       <p:pic>
         <p:nvPicPr>
-          <p:cNvPr id="7" name="Picture 6">
-            <a:extLst>
-              <a:ext uri="{FF2B5EF4-FFF2-40B4-BE49-F238E27FC236}">
-                <a16:creationId xmlns:a16="http://schemas.microsoft.com/office/drawing/2014/main" id="{4B22EDC4-2557-40C8-926A-B7A912DE7143}"/>
+          <p:cNvPr id="6" name="Picture 5">
+            <a:extLst>
+              <a:ext uri="{FF2B5EF4-FFF2-40B4-BE49-F238E27FC236}">
+                <a16:creationId xmlns:a16="http://schemas.microsoft.com/office/drawing/2014/main" id="{7C7C4B75-8299-40F9-8FBB-31781F1B8E4A}"/>
               </a:ext>
             </a:extLst>
           </p:cNvPr>
@@ -3552,8 +3585,8 @@
         </p:blipFill>
         <p:spPr>
           <a:xfrm>
-            <a:off x="4346392" y="1867395"/>
-            <a:ext cx="3230111" cy="3230111"/>
+            <a:off x="4475960" y="2193351"/>
+            <a:ext cx="3200400" cy="3200400"/>
           </a:xfrm>
           <a:prstGeom prst="rect">
             <a:avLst/>
@@ -3562,10 +3595,10 @@
       </p:pic>
       <p:pic>
         <p:nvPicPr>
-          <p:cNvPr id="9" name="Picture 8">
-            <a:extLst>
-              <a:ext uri="{FF2B5EF4-FFF2-40B4-BE49-F238E27FC236}">
-                <a16:creationId xmlns:a16="http://schemas.microsoft.com/office/drawing/2014/main" id="{925D70AC-11CB-4031-A647-941028BCF906}"/>
+          <p:cNvPr id="10" name="Picture 9">
+            <a:extLst>
+              <a:ext uri="{FF2B5EF4-FFF2-40B4-BE49-F238E27FC236}">
+                <a16:creationId xmlns:a16="http://schemas.microsoft.com/office/drawing/2014/main" id="{8EAD6A97-9EBA-4008-85E9-2A4D409F264D}"/>
               </a:ext>
             </a:extLst>
           </p:cNvPr>
@@ -3588,42 +3621,14 @@
         </p:blipFill>
         <p:spPr>
           <a:xfrm>
-            <a:off x="7695157" y="1867395"/>
-            <a:ext cx="4306815" cy="3230111"/>
+            <a:off x="7716042" y="2193351"/>
+            <a:ext cx="4267200" cy="3200400"/>
           </a:xfrm>
           <a:prstGeom prst="rect">
             <a:avLst/>
           </a:prstGeom>
         </p:spPr>
       </p:pic>
-      <p:sp>
-        <p:nvSpPr>
-          <p:cNvPr id="12" name="Title 11">
-            <a:extLst>
-              <a:ext uri="{FF2B5EF4-FFF2-40B4-BE49-F238E27FC236}">
-                <a16:creationId xmlns:a16="http://schemas.microsoft.com/office/drawing/2014/main" id="{8C3D6B67-4A9A-49E9-BD5C-3DB96750E67E}"/>
-              </a:ext>
-            </a:extLst>
-          </p:cNvPr>
-          <p:cNvSpPr>
-            <a:spLocks noGrp="1"/>
-          </p:cNvSpPr>
-          <p:nvPr>
-            <p:ph type="title"/>
-          </p:nvPr>
-        </p:nvSpPr>
-        <p:spPr/>
-        <p:txBody>
-          <a:bodyPr/>
-          <a:lstStyle/>
-          <a:p>
-            <a:r>
-              <a:rPr lang="en-US" dirty="0"/>
-              <a:t>No breaks (temporal or spatial) – 31 Jan</a:t>
-            </a:r>
-          </a:p>
-        </p:txBody>
-      </p:sp>
     </p:spTree>
     <p:extLst>
       <p:ext uri="{BB962C8B-B14F-4D97-AF65-F5344CB8AC3E}">

</xml_diff>